<commit_message>
[add] webgpu hello triangle demo and notes.
</commit_message>
<xml_diff>
--- a/经典雅可比一般公式推导.pptx
+++ b/经典雅可比一般公式推导.pptx
@@ -268,7 +268,7 @@
           <a:p>
             <a:fld id="{D711C8FD-EDD2-44DF-B444-7B53BF1030B4}" type="datetimeFigureOut">
               <a:rPr lang="zh-CN" altLang="en-US" smtClean="0"/>
-              <a:t>3/15 Mon</a:t>
+              <a:t>3/17 Wed</a:t>
             </a:fld>
             <a:endParaRPr lang="zh-CN" altLang="en-US"/>
           </a:p>
@@ -466,7 +466,7 @@
           <a:p>
             <a:fld id="{D711C8FD-EDD2-44DF-B444-7B53BF1030B4}" type="datetimeFigureOut">
               <a:rPr lang="zh-CN" altLang="en-US" smtClean="0"/>
-              <a:t>3/15 Mon</a:t>
+              <a:t>3/17 Wed</a:t>
             </a:fld>
             <a:endParaRPr lang="zh-CN" altLang="en-US"/>
           </a:p>
@@ -674,7 +674,7 @@
           <a:p>
             <a:fld id="{D711C8FD-EDD2-44DF-B444-7B53BF1030B4}" type="datetimeFigureOut">
               <a:rPr lang="zh-CN" altLang="en-US" smtClean="0"/>
-              <a:t>3/15 Mon</a:t>
+              <a:t>3/17 Wed</a:t>
             </a:fld>
             <a:endParaRPr lang="zh-CN" altLang="en-US"/>
           </a:p>
@@ -872,7 +872,7 @@
           <a:p>
             <a:fld id="{D711C8FD-EDD2-44DF-B444-7B53BF1030B4}" type="datetimeFigureOut">
               <a:rPr lang="zh-CN" altLang="en-US" smtClean="0"/>
-              <a:t>3/15 Mon</a:t>
+              <a:t>3/17 Wed</a:t>
             </a:fld>
             <a:endParaRPr lang="zh-CN" altLang="en-US"/>
           </a:p>
@@ -1147,7 +1147,7 @@
           <a:p>
             <a:fld id="{D711C8FD-EDD2-44DF-B444-7B53BF1030B4}" type="datetimeFigureOut">
               <a:rPr lang="zh-CN" altLang="en-US" smtClean="0"/>
-              <a:t>3/15 Mon</a:t>
+              <a:t>3/17 Wed</a:t>
             </a:fld>
             <a:endParaRPr lang="zh-CN" altLang="en-US"/>
           </a:p>
@@ -1412,7 +1412,7 @@
           <a:p>
             <a:fld id="{D711C8FD-EDD2-44DF-B444-7B53BF1030B4}" type="datetimeFigureOut">
               <a:rPr lang="zh-CN" altLang="en-US" smtClean="0"/>
-              <a:t>3/15 Mon</a:t>
+              <a:t>3/17 Wed</a:t>
             </a:fld>
             <a:endParaRPr lang="zh-CN" altLang="en-US"/>
           </a:p>
@@ -1824,7 +1824,7 @@
           <a:p>
             <a:fld id="{D711C8FD-EDD2-44DF-B444-7B53BF1030B4}" type="datetimeFigureOut">
               <a:rPr lang="zh-CN" altLang="en-US" smtClean="0"/>
-              <a:t>3/15 Mon</a:t>
+              <a:t>3/17 Wed</a:t>
             </a:fld>
             <a:endParaRPr lang="zh-CN" altLang="en-US"/>
           </a:p>
@@ -1965,7 +1965,7 @@
           <a:p>
             <a:fld id="{D711C8FD-EDD2-44DF-B444-7B53BF1030B4}" type="datetimeFigureOut">
               <a:rPr lang="zh-CN" altLang="en-US" smtClean="0"/>
-              <a:t>3/15 Mon</a:t>
+              <a:t>3/17 Wed</a:t>
             </a:fld>
             <a:endParaRPr lang="zh-CN" altLang="en-US"/>
           </a:p>
@@ -2078,7 +2078,7 @@
           <a:p>
             <a:fld id="{D711C8FD-EDD2-44DF-B444-7B53BF1030B4}" type="datetimeFigureOut">
               <a:rPr lang="zh-CN" altLang="en-US" smtClean="0"/>
-              <a:t>3/15 Mon</a:t>
+              <a:t>3/17 Wed</a:t>
             </a:fld>
             <a:endParaRPr lang="zh-CN" altLang="en-US"/>
           </a:p>
@@ -2389,7 +2389,7 @@
           <a:p>
             <a:fld id="{D711C8FD-EDD2-44DF-B444-7B53BF1030B4}" type="datetimeFigureOut">
               <a:rPr lang="zh-CN" altLang="en-US" smtClean="0"/>
-              <a:t>3/15 Mon</a:t>
+              <a:t>3/17 Wed</a:t>
             </a:fld>
             <a:endParaRPr lang="zh-CN" altLang="en-US"/>
           </a:p>
@@ -2677,7 +2677,7 @@
           <a:p>
             <a:fld id="{D711C8FD-EDD2-44DF-B444-7B53BF1030B4}" type="datetimeFigureOut">
               <a:rPr lang="zh-CN" altLang="en-US" smtClean="0"/>
-              <a:t>3/15 Mon</a:t>
+              <a:t>3/17 Wed</a:t>
             </a:fld>
             <a:endParaRPr lang="zh-CN" altLang="en-US"/>
           </a:p>
@@ -2918,7 +2918,7 @@
           <a:p>
             <a:fld id="{D711C8FD-EDD2-44DF-B444-7B53BF1030B4}" type="datetimeFigureOut">
               <a:rPr lang="zh-CN" altLang="en-US" smtClean="0"/>
-              <a:t>3/15 Mon</a:t>
+              <a:t>3/17 Wed</a:t>
             </a:fld>
             <a:endParaRPr lang="zh-CN" altLang="en-US"/>
           </a:p>

</xml_diff>